<commit_message>
Hyperlink fix, comment fix in code
</commit_message>
<xml_diff>
--- a/android/uitest/doc/slides.pptx
+++ b/android/uitest/doc/slides.pptx
@@ -5,14 +5,15 @@
     <p:sldMasterId id="2147483660" r:id="rId1"/>
   </p:sldMasterIdLst>
   <p:notesMasterIdLst>
-    <p:notesMasterId r:id="rId7"/>
+    <p:notesMasterId r:id="rId8"/>
   </p:notesMasterIdLst>
   <p:sldIdLst>
     <p:sldId id="257" r:id="rId2"/>
     <p:sldId id="256" r:id="rId3"/>
     <p:sldId id="258" r:id="rId4"/>
     <p:sldId id="260" r:id="rId5"/>
-    <p:sldId id="259" r:id="rId6"/>
+    <p:sldId id="261" r:id="rId6"/>
+    <p:sldId id="259" r:id="rId7"/>
   </p:sldIdLst>
   <p:sldSz cx="12192000" cy="6858000"/>
   <p:notesSz cx="6858000" cy="9144000"/>
@@ -3880,27 +3881,8 @@
                 <a:cs typeface="Arial"/>
                 <a:sym typeface="Arial"/>
               </a:rPr>
-              <a:t>The framework also ensures that your activity is started before the tests run and that a test wait until all background activities have finished</a:t>
-            </a:r>
-            <a:r>
-              <a:rPr lang="en-US" sz="2600" dirty="0" smtClean="0">
-                <a:solidFill>
-                  <a:srgbClr val="000000"/>
-                </a:solidFill>
-                <a:latin typeface="Arial"/>
-                <a:cs typeface="Arial"/>
-                <a:sym typeface="Arial"/>
-              </a:rPr>
-              <a:t>.</a:t>
-            </a:r>
-            <a:endParaRPr lang="en-US" sz="2600" dirty="0" smtClean="0">
-              <a:solidFill>
-                <a:srgbClr val="000000"/>
-              </a:solidFill>
-              <a:latin typeface="Arial"/>
-              <a:cs typeface="Arial"/>
-              <a:sym typeface="Arial"/>
-            </a:endParaRPr>
+              <a:t>The framework also ensures that your activity is started before the tests run and that a test wait until all background activities have finished.</a:t>
+            </a:r>
           </a:p>
         </p:txBody>
       </p:sp>
@@ -3962,8 +3944,9 @@
             </a:r>
             <a:r>
               <a:rPr lang="en-US" dirty="0"/>
-              <a:t>5</a:t>
-            </a:r>
+              <a:t>6</a:t>
+            </a:r>
+            <a:endParaRPr lang="en-US" dirty="0"/>
           </a:p>
         </p:txBody>
       </p:sp>
@@ -4392,7 +4375,11 @@
           <a:p>
             <a:r>
               <a:rPr lang="en-US" dirty="0" smtClean="0"/>
-              <a:t>/  5</a:t>
+              <a:t>/  </a:t>
+            </a:r>
+            <a:r>
+              <a:rPr lang="en-US" dirty="0" smtClean="0"/>
+              <a:t>6</a:t>
             </a:r>
             <a:endParaRPr lang="en-US" dirty="0"/>
           </a:p>
@@ -4938,7 +4925,11 @@
           <a:p>
             <a:r>
               <a:rPr lang="en-US" dirty="0" smtClean="0"/>
-              <a:t>/  5</a:t>
+              <a:t>/  </a:t>
+            </a:r>
+            <a:r>
+              <a:rPr lang="en-US" dirty="0" smtClean="0"/>
+              <a:t>6</a:t>
             </a:r>
             <a:endParaRPr lang="en-US" dirty="0"/>
           </a:p>
@@ -5133,7 +5124,11 @@
           <a:p>
             <a:r>
               <a:rPr lang="en-US" dirty="0" smtClean="0"/>
-              <a:t>/  5</a:t>
+              <a:t>/  </a:t>
+            </a:r>
+            <a:r>
+              <a:rPr lang="en-US" dirty="0" smtClean="0"/>
+              <a:t>6</a:t>
             </a:r>
             <a:endParaRPr lang="en-US" dirty="0"/>
           </a:p>
@@ -5310,6 +5305,218 @@
       </p:grpSpPr>
       <p:sp>
         <p:nvSpPr>
+          <p:cNvPr id="2" name="Title 1"/>
+          <p:cNvSpPr>
+            <a:spLocks noGrp="1"/>
+          </p:cNvSpPr>
+          <p:nvPr>
+            <p:ph type="title"/>
+          </p:nvPr>
+        </p:nvSpPr>
+        <p:spPr>
+          <a:xfrm>
+            <a:off x="838200" y="365125"/>
+            <a:ext cx="10515600" cy="972607"/>
+          </a:xfrm>
+        </p:spPr>
+        <p:txBody>
+          <a:bodyPr>
+            <a:normAutofit/>
+          </a:bodyPr>
+          <a:lstStyle/>
+          <a:p>
+            <a:r>
+              <a:rPr lang="en-US" b="1" dirty="0" smtClean="0">
+                <a:latin typeface="Arial"/>
+                <a:cs typeface="Arial"/>
+              </a:rPr>
+              <a:t>References:</a:t>
+            </a:r>
+            <a:endParaRPr lang="en-US" b="1" dirty="0">
+              <a:latin typeface="Arial"/>
+              <a:cs typeface="Arial"/>
+            </a:endParaRPr>
+          </a:p>
+        </p:txBody>
+      </p:sp>
+      <p:sp>
+        <p:nvSpPr>
+          <p:cNvPr id="3" name="Content Placeholder 2"/>
+          <p:cNvSpPr>
+            <a:spLocks noGrp="1"/>
+          </p:cNvSpPr>
+          <p:nvPr>
+            <p:ph idx="1"/>
+          </p:nvPr>
+        </p:nvSpPr>
+        <p:spPr>
+          <a:xfrm>
+            <a:off x="838200" y="1490133"/>
+            <a:ext cx="10515600" cy="4686830"/>
+          </a:xfrm>
+        </p:spPr>
+        <p:txBody>
+          <a:bodyPr/>
+          <a:lstStyle/>
+          <a:p>
+            <a:r>
+              <a:rPr lang="en-US" dirty="0">
+                <a:latin typeface="Arial"/>
+                <a:cs typeface="Arial"/>
+                <a:hlinkClick r:id="rId2"/>
+              </a:rPr>
+              <a:t>UI </a:t>
+            </a:r>
+            <a:r>
+              <a:rPr lang="en-US">
+                <a:latin typeface="Arial"/>
+                <a:cs typeface="Arial"/>
+                <a:hlinkClick r:id="rId2"/>
+              </a:rPr>
+              <a:t>Testing </a:t>
+            </a:r>
+            <a:r>
+              <a:rPr lang="en-US" smtClean="0">
+                <a:latin typeface="Arial"/>
+                <a:cs typeface="Arial"/>
+                <a:hlinkClick r:id="rId2"/>
+              </a:rPr>
+              <a:t>Espresso</a:t>
+            </a:r>
+            <a:endParaRPr lang="en-US" dirty="0" smtClean="0">
+              <a:latin typeface="Arial"/>
+              <a:cs typeface="Arial"/>
+              <a:hlinkClick r:id="rId3"/>
+            </a:endParaRPr>
+          </a:p>
+          <a:p>
+            <a:r>
+              <a:rPr lang="en-US" dirty="0" smtClean="0">
+                <a:latin typeface="Arial"/>
+                <a:cs typeface="Arial"/>
+                <a:hlinkClick r:id="rId3"/>
+              </a:rPr>
+              <a:t>Espresso Sheet</a:t>
+            </a:r>
+            <a:endParaRPr lang="en-US" dirty="0" smtClean="0">
+              <a:latin typeface="Arial"/>
+              <a:cs typeface="Arial"/>
+            </a:endParaRPr>
+          </a:p>
+        </p:txBody>
+      </p:sp>
+      <p:sp>
+        <p:nvSpPr>
+          <p:cNvPr id="4" name="Date Placeholder 3"/>
+          <p:cNvSpPr>
+            <a:spLocks noGrp="1"/>
+          </p:cNvSpPr>
+          <p:nvPr>
+            <p:ph type="dt" sz="half" idx="10"/>
+          </p:nvPr>
+        </p:nvSpPr>
+        <p:spPr/>
+        <p:txBody>
+          <a:bodyPr/>
+          <a:lstStyle/>
+          <a:p>
+            <a:r>
+              <a:rPr lang="en-US" smtClean="0"/>
+              <a:t>tutorial/android</a:t>
+            </a:r>
+            <a:endParaRPr lang="en-US"/>
+          </a:p>
+        </p:txBody>
+      </p:sp>
+      <p:sp>
+        <p:nvSpPr>
+          <p:cNvPr id="5" name="Footer Placeholder 4"/>
+          <p:cNvSpPr>
+            <a:spLocks noGrp="1"/>
+          </p:cNvSpPr>
+          <p:nvPr>
+            <p:ph type="ftr" sz="quarter" idx="11"/>
+          </p:nvPr>
+        </p:nvSpPr>
+        <p:spPr/>
+        <p:txBody>
+          <a:bodyPr/>
+          <a:lstStyle/>
+          <a:p>
+            <a:r>
+              <a:rPr lang="en-US" dirty="0" smtClean="0"/>
+              <a:t>/  </a:t>
+            </a:r>
+            <a:r>
+              <a:rPr lang="en-US" dirty="0" smtClean="0"/>
+              <a:t>6</a:t>
+            </a:r>
+            <a:endParaRPr lang="en-US" dirty="0"/>
+          </a:p>
+        </p:txBody>
+      </p:sp>
+      <p:sp>
+        <p:nvSpPr>
+          <p:cNvPr id="6" name="Slide Number Placeholder 5"/>
+          <p:cNvSpPr>
+            <a:spLocks noGrp="1"/>
+          </p:cNvSpPr>
+          <p:nvPr>
+            <p:ph type="sldNum" sz="quarter" idx="12"/>
+          </p:nvPr>
+        </p:nvSpPr>
+        <p:spPr/>
+        <p:txBody>
+          <a:bodyPr/>
+          <a:lstStyle/>
+          <a:p>
+            <a:fld id="{FD147BFD-0D12-4E70-A1D2-9100D33DAACD}" type="slidenum">
+              <a:rPr lang="en-US" smtClean="0"/>
+              <a:t>5</a:t>
+            </a:fld>
+            <a:endParaRPr lang="en-US"/>
+          </a:p>
+        </p:txBody>
+      </p:sp>
+    </p:spTree>
+    <p:extLst>
+      <p:ext uri="{BB962C8B-B14F-4D97-AF65-F5344CB8AC3E}">
+        <p14:creationId xmlns:p14="http://schemas.microsoft.com/office/powerpoint/2010/main" val="1986394131"/>
+      </p:ext>
+    </p:extLst>
+  </p:cSld>
+  <p:clrMapOvr>
+    <a:masterClrMapping/>
+  </p:clrMapOvr>
+  <p:timing>
+    <p:tnLst>
+      <p:par>
+        <p:cTn xmlns:p14="http://schemas.microsoft.com/office/powerpoint/2010/main" id="1" dur="indefinite" restart="never" nodeType="tmRoot"/>
+      </p:par>
+    </p:tnLst>
+  </p:timing>
+</p:sld>
+</file>
+
+<file path=ppt/slides/slide6.xml><?xml version="1.0" encoding="utf-8"?>
+<p:sld xmlns:a="http://schemas.openxmlformats.org/drawingml/2006/main" xmlns:r="http://schemas.openxmlformats.org/officeDocument/2006/relationships" xmlns:p="http://schemas.openxmlformats.org/presentationml/2006/main">
+  <p:cSld>
+    <p:spTree>
+      <p:nvGrpSpPr>
+        <p:cNvPr id="1" name=""/>
+        <p:cNvGrpSpPr/>
+        <p:nvPr/>
+      </p:nvGrpSpPr>
+      <p:grpSpPr>
+        <a:xfrm>
+          <a:off x="0" y="0"/>
+          <a:ext cx="0" cy="0"/>
+          <a:chOff x="0" y="0"/>
+          <a:chExt cx="0" cy="0"/>
+        </a:xfrm>
+      </p:grpSpPr>
+      <p:sp>
+        <p:nvSpPr>
           <p:cNvPr id="9" name="Date Placeholder 3"/>
           <p:cNvSpPr>
             <a:spLocks noGrp="1"/>
@@ -5362,7 +5569,11 @@
           <a:p>
             <a:r>
               <a:rPr lang="en-US" dirty="0" smtClean="0"/>
-              <a:t>/  5</a:t>
+              <a:t>/  </a:t>
+            </a:r>
+            <a:r>
+              <a:rPr lang="en-US" dirty="0" smtClean="0"/>
+              <a:t>6</a:t>
             </a:r>
             <a:endParaRPr lang="en-US" dirty="0"/>
           </a:p>
@@ -5390,7 +5601,7 @@
           <a:p>
             <a:fld id="{FD147BFD-0D12-4E70-A1D2-9100D33DAACD}" type="slidenum">
               <a:rPr lang="en-US" smtClean="0"/>
-              <a:t>5</a:t>
+              <a:t>6</a:t>
             </a:fld>
             <a:endParaRPr lang="en-US" dirty="0"/>
           </a:p>
@@ -6308,7 +6519,7 @@
   <a:extraClrSchemeLst/>
   <a:extLst>
     <a:ext uri="{05A4C25C-085E-4340-85A3-A5531E510DB2}">
-      <thm15:themeFamily xmlns="" xmlns:thm15="http://schemas.microsoft.com/office/thememl/2012/main" name="androidSlides" id="{BE1B15B1-4952-4CBB-9E8A-BEB2E0634118}" vid="{AC433EC5-E69B-4CC3-B82C-6B66EB6E72A3}"/>
+      <thm15:themeFamily xmlns:thm15="http://schemas.microsoft.com/office/thememl/2012/main" xmlns="" name="androidSlides" id="{BE1B15B1-4952-4CBB-9E8A-BEB2E0634118}" vid="{AC433EC5-E69B-4CC3-B82C-6B66EB6E72A3}"/>
     </a:ext>
   </a:extLst>
 </a:theme>
@@ -6569,7 +6780,7 @@
   <a:extraClrSchemeLst/>
   <a:extLst>
     <a:ext uri="{05A4C25C-085E-4340-85A3-A5531E510DB2}">
-      <thm15:themeFamily xmlns="" xmlns:thm15="http://schemas.microsoft.com/office/thememl/2012/main" name="Office Theme" id="{62F939B6-93AF-4DB8-9C6B-D6C7DFDC589F}" vid="{4A3C46E8-61CC-4603-A589-7422A47A8E4A}"/>
+      <thm15:themeFamily xmlns:thm15="http://schemas.microsoft.com/office/thememl/2012/main" xmlns="" name="Office Theme" id="{62F939B6-93AF-4DB8-9C6B-D6C7DFDC589F}" vid="{4A3C46E8-61CC-4603-A589-7422A47A8E4A}"/>
     </a:ext>
   </a:extLst>
 </a:theme>

</xml_diff>